<commit_message>
fixed date of presentation
</commit_message>
<xml_diff>
--- a/presentations/05_24_2018_dc_group/dc_group_meeting_may24.pptx
+++ b/presentations/05_24_2018_dc_group/dc_group_meeting_may24.pptx
@@ -2986,7 +2986,11 @@
           <a:p>
             <a:r>
               <a:rPr lang="en-US" dirty="0" smtClean="0"/>
-              <a:t>DC Group Meeting 5/23/18</a:t>
+              <a:t>DC Group </a:t>
+            </a:r>
+            <a:r>
+              <a:rPr lang="en-US" smtClean="0"/>
+              <a:t>Meeting 5/24/18</a:t>
             </a:r>
             <a:endParaRPr lang="en-US" dirty="0"/>
           </a:p>

</xml_diff>